<commit_message>
Update Témalabor - Centralized log server.pptx
</commit_message>
<xml_diff>
--- a/Témalabor - Centralized log server.pptx
+++ b/Témalabor - Centralized log server.pptx
@@ -11722,11 +11722,12 @@
               </a:rPr>
               <a:t> </a:t>
             </a:r>
-            <a:br>
-              <a:rPr lang="hu-HU" dirty="0">
-                <a:latin typeface="Abadi" panose="020B0604020104020204" pitchFamily="34" charset="0"/>
-              </a:rPr>
-            </a:br>
+          </a:p>
+          <a:p>
+            <a:pPr marL="285750" indent="-285750">
+              <a:buFont typeface="Arial" panose="020B0604020202020204" pitchFamily="34" charset="0"/>
+              <a:buChar char="•"/>
+            </a:pPr>
             <a:r>
               <a:rPr lang="hu-HU" dirty="0" err="1">
                 <a:latin typeface="Abadi" panose="020B0604020104020204" pitchFamily="34" charset="0"/>
@@ -11976,10 +11977,15 @@
             <p:ph idx="1"/>
           </p:nvPr>
         </p:nvSpPr>
-        <p:spPr/>
+        <p:spPr>
+          <a:xfrm>
+            <a:off x="668726" y="847148"/>
+            <a:ext cx="10515600" cy="4351338"/>
+          </a:xfrm>
+        </p:spPr>
         <p:txBody>
           <a:bodyPr>
-            <a:normAutofit fontScale="85000" lnSpcReduction="20000"/>
+            <a:normAutofit fontScale="92500" lnSpcReduction="10000"/>
           </a:bodyPr>
           <a:lstStyle/>
           <a:p>
@@ -12145,12 +12151,9 @@
             </a:r>
           </a:p>
           <a:p>
-            <a:endParaRPr lang="hu-HU" b="0" dirty="0">
-              <a:effectLst/>
-              <a:latin typeface="Abadi" panose="020B0604020104020204" pitchFamily="34" charset="0"/>
-            </a:endParaRPr>
-          </a:p>
-          <a:p>
+            <a:pPr marL="0" indent="0">
+              <a:buNone/>
+            </a:pPr>
             <a:br>
               <a:rPr lang="hu-HU" b="0" dirty="0">
                 <a:effectLst/>
@@ -12199,106 +12202,6 @@
           <a:chExt cx="0" cy="0"/>
         </a:xfrm>
       </p:grpSpPr>
-      <p:sp>
-        <p:nvSpPr>
-          <p:cNvPr id="2" name="Cím 1">
-            <a:extLst>
-              <a:ext uri="{FF2B5EF4-FFF2-40B4-BE49-F238E27FC236}">
-                <a16:creationId xmlns:a16="http://schemas.microsoft.com/office/drawing/2014/main" id="{67FFE128-28A9-4095-B99A-C85CCB9D94D4}"/>
-              </a:ext>
-            </a:extLst>
-          </p:cNvPr>
-          <p:cNvSpPr>
-            <a:spLocks noGrp="1"/>
-          </p:cNvSpPr>
-          <p:nvPr>
-            <p:ph type="title"/>
-          </p:nvPr>
-        </p:nvSpPr>
-        <p:spPr>
-          <a:xfrm>
-            <a:off x="110067" y="500591"/>
-            <a:ext cx="10515600" cy="1325563"/>
-          </a:xfrm>
-        </p:spPr>
-        <p:txBody>
-          <a:bodyPr>
-            <a:normAutofit fontScale="90000"/>
-          </a:bodyPr>
-          <a:lstStyle/>
-          <a:p>
-            <a:r>
-              <a:rPr lang="hu-HU" b="0" i="0" cap="all" dirty="0">
-                <a:solidFill>
-                  <a:srgbClr val="1A1A1B"/>
-                </a:solidFill>
-                <a:effectLst/>
-                <a:latin typeface="Agency FB" panose="020B0503020202020204" pitchFamily="34" charset="0"/>
-              </a:rPr>
-              <a:t>SEARCH</a:t>
-            </a:r>
-            <a:r>
-              <a:rPr lang="hu-HU" b="0" i="0" cap="all" dirty="0">
-                <a:solidFill>
-                  <a:srgbClr val="1A1A1B"/>
-                </a:solidFill>
-                <a:effectLst/>
-                <a:latin typeface="Oswald" panose="020B0604020202020204" pitchFamily="2" charset="-18"/>
-              </a:rPr>
-              <a:t> </a:t>
-            </a:r>
-            <a:r>
-              <a:rPr lang="hu-HU" b="0" i="0" cap="all" dirty="0">
-                <a:solidFill>
-                  <a:srgbClr val="1A1A1B"/>
-                </a:solidFill>
-                <a:effectLst/>
-                <a:latin typeface="Agency FB" panose="020B0503020202020204" pitchFamily="34" charset="0"/>
-              </a:rPr>
-              <a:t>QUERY</a:t>
-            </a:r>
-            <a:r>
-              <a:rPr lang="hu-HU" b="0" i="0" cap="all" dirty="0">
-                <a:solidFill>
-                  <a:srgbClr val="1A1A1B"/>
-                </a:solidFill>
-                <a:effectLst/>
-                <a:latin typeface="Oswald" panose="020B0604020202020204" pitchFamily="2" charset="-18"/>
-              </a:rPr>
-              <a:t> </a:t>
-            </a:r>
-            <a:r>
-              <a:rPr lang="hu-HU" b="0" i="0" cap="all" dirty="0">
-                <a:solidFill>
-                  <a:srgbClr val="1A1A1B"/>
-                </a:solidFill>
-                <a:effectLst/>
-                <a:latin typeface="Agency FB" panose="020B0503020202020204" pitchFamily="34" charset="0"/>
-              </a:rPr>
-              <a:t>LANGUAGE</a:t>
-            </a:r>
-            <a:br>
-              <a:rPr lang="hu-HU" b="0" i="0" cap="all" dirty="0">
-                <a:solidFill>
-                  <a:srgbClr val="1A1A1B"/>
-                </a:solidFill>
-                <a:effectLst/>
-                <a:latin typeface="Oswald" panose="020B0604020202020204" pitchFamily="2" charset="-18"/>
-              </a:rPr>
-            </a:br>
-            <a:br>
-              <a:rPr lang="hu-HU" b="0" i="0" dirty="0">
-                <a:solidFill>
-                  <a:srgbClr val="8E8E8E"/>
-                </a:solidFill>
-                <a:effectLst/>
-                <a:latin typeface="Oswald" panose="020B0604020202020204" pitchFamily="2" charset="-18"/>
-              </a:rPr>
-            </a:br>
-            <a:endParaRPr lang="hu-HU" dirty="0"/>
-          </a:p>
-        </p:txBody>
-      </p:sp>
       <p:pic>
         <p:nvPicPr>
           <p:cNvPr id="5" name="Tartalom helye 4">
@@ -12323,11 +12226,175 @@
         </p:blipFill>
         <p:spPr>
           <a:xfrm>
-            <a:off x="4175681" y="1851025"/>
+            <a:off x="1264530" y="1253331"/>
             <a:ext cx="7178119" cy="4351338"/>
           </a:xfrm>
         </p:spPr>
       </p:pic>
+      <p:sp>
+        <p:nvSpPr>
+          <p:cNvPr id="4" name="Téglalap 3">
+            <a:extLst>
+              <a:ext uri="{FF2B5EF4-FFF2-40B4-BE49-F238E27FC236}">
+                <a16:creationId xmlns:a16="http://schemas.microsoft.com/office/drawing/2014/main" id="{99203289-90F4-45F2-9673-7E44EB910332}"/>
+              </a:ext>
+            </a:extLst>
+          </p:cNvPr>
+          <p:cNvSpPr/>
+          <p:nvPr/>
+        </p:nvSpPr>
+        <p:spPr>
+          <a:xfrm>
+            <a:off x="0" y="0"/>
+            <a:ext cx="274320" cy="6858000"/>
+          </a:xfrm>
+          <a:prstGeom prst="rect">
+            <a:avLst/>
+          </a:prstGeom>
+          <a:solidFill>
+            <a:srgbClr val="A01B17"/>
+          </a:solidFill>
+          <a:ln>
+            <a:noFill/>
+          </a:ln>
+        </p:spPr>
+        <p:style>
+          <a:lnRef idx="2">
+            <a:schemeClr val="accent1">
+              <a:shade val="50000"/>
+            </a:schemeClr>
+          </a:lnRef>
+          <a:fillRef idx="1">
+            <a:schemeClr val="accent1"/>
+          </a:fillRef>
+          <a:effectRef idx="0">
+            <a:schemeClr val="accent1"/>
+          </a:effectRef>
+          <a:fontRef idx="minor">
+            <a:schemeClr val="lt1"/>
+          </a:fontRef>
+        </p:style>
+        <p:txBody>
+          <a:bodyPr rtlCol="0" anchor="ctr"/>
+          <a:lstStyle/>
+          <a:p>
+            <a:pPr algn="ctr"/>
+            <a:endParaRPr lang="hu-HU"/>
+          </a:p>
+        </p:txBody>
+      </p:sp>
+      <p:pic>
+        <p:nvPicPr>
+          <p:cNvPr id="6" name="Ábra 5">
+            <a:extLst>
+              <a:ext uri="{FF2B5EF4-FFF2-40B4-BE49-F238E27FC236}">
+                <a16:creationId xmlns:a16="http://schemas.microsoft.com/office/drawing/2014/main" id="{0735D8E8-3B8F-4951-A68D-84963FB383DB}"/>
+              </a:ext>
+            </a:extLst>
+          </p:cNvPr>
+          <p:cNvPicPr>
+            <a:picLocks noChangeAspect="1"/>
+          </p:cNvPicPr>
+          <p:nvPr/>
+        </p:nvPicPr>
+        <p:blipFill>
+          <a:blip r:embed="rId3" cstate="print">
+            <a:extLst>
+              <a:ext uri="{28A0092B-C50C-407E-A947-70E740481C1C}">
+                <a14:useLocalDpi xmlns:a14="http://schemas.microsoft.com/office/drawing/2010/main" val="0"/>
+              </a:ext>
+              <a:ext uri="{96DAC541-7B7A-43D3-8B79-37D633B846F1}">
+                <asvg:svgBlip xmlns:asvg="http://schemas.microsoft.com/office/drawing/2016/SVG/main" r:embed="rId4"/>
+              </a:ext>
+            </a:extLst>
+          </a:blip>
+          <a:stretch>
+            <a:fillRect/>
+          </a:stretch>
+        </p:blipFill>
+        <p:spPr>
+          <a:xfrm>
+            <a:off x="10649436" y="5366437"/>
+            <a:ext cx="1406504" cy="1358419"/>
+          </a:xfrm>
+          <a:prstGeom prst="rect">
+            <a:avLst/>
+          </a:prstGeom>
+        </p:spPr>
+      </p:pic>
+      <p:pic>
+        <p:nvPicPr>
+          <p:cNvPr id="7" name="Kép 6">
+            <a:extLst>
+              <a:ext uri="{FF2B5EF4-FFF2-40B4-BE49-F238E27FC236}">
+                <a16:creationId xmlns:a16="http://schemas.microsoft.com/office/drawing/2014/main" id="{EE3A0A4F-FDA8-4657-A7EE-5F034DE0E737}"/>
+              </a:ext>
+            </a:extLst>
+          </p:cNvPr>
+          <p:cNvPicPr>
+            <a:picLocks noChangeAspect="1"/>
+          </p:cNvPicPr>
+          <p:nvPr/>
+        </p:nvPicPr>
+        <p:blipFill>
+          <a:blip r:embed="rId5" cstate="print">
+            <a:extLst>
+              <a:ext uri="{28A0092B-C50C-407E-A947-70E740481C1C}">
+                <a14:useLocalDpi xmlns:a14="http://schemas.microsoft.com/office/drawing/2010/main" val="0"/>
+              </a:ext>
+            </a:extLst>
+          </a:blip>
+          <a:stretch>
+            <a:fillRect/>
+          </a:stretch>
+        </p:blipFill>
+        <p:spPr>
+          <a:xfrm>
+            <a:off x="11578732" y="2553"/>
+            <a:ext cx="613267" cy="613267"/>
+          </a:xfrm>
+          <a:prstGeom prst="rect">
+            <a:avLst/>
+          </a:prstGeom>
+        </p:spPr>
+      </p:pic>
+      <p:sp>
+        <p:nvSpPr>
+          <p:cNvPr id="9" name="Szövegdoboz 8">
+            <a:extLst>
+              <a:ext uri="{FF2B5EF4-FFF2-40B4-BE49-F238E27FC236}">
+                <a16:creationId xmlns:a16="http://schemas.microsoft.com/office/drawing/2014/main" id="{1A502F05-CD5F-42D0-9549-9F22F3A02CE6}"/>
+              </a:ext>
+            </a:extLst>
+          </p:cNvPr>
+          <p:cNvSpPr txBox="1"/>
+          <p:nvPr/>
+        </p:nvSpPr>
+        <p:spPr>
+          <a:xfrm>
+            <a:off x="274320" y="0"/>
+            <a:ext cx="4368504" cy="707886"/>
+          </a:xfrm>
+          <a:prstGeom prst="rect">
+            <a:avLst/>
+          </a:prstGeom>
+          <a:noFill/>
+        </p:spPr>
+        <p:txBody>
+          <a:bodyPr wrap="none" rtlCol="0">
+            <a:spAutoFit/>
+          </a:bodyPr>
+          <a:lstStyle/>
+          <a:p>
+            <a:r>
+              <a:rPr lang="hu-HU" sz="4000" dirty="0">
+                <a:latin typeface="Agency FB" panose="020B0503020202020204" pitchFamily="34" charset="0"/>
+              </a:rPr>
+              <a:t>SEARCH QUERY LANGUAGE</a:t>
+            </a:r>
+          </a:p>
+        </p:txBody>
+      </p:sp>
     </p:spTree>
     <p:extLst>
       <p:ext uri="{BB962C8B-B14F-4D97-AF65-F5344CB8AC3E}">

</xml_diff>